<commit_message>
Add real-time status Close(#26) Close(#27)
</commit_message>
<xml_diff>
--- a/Documents/Presentation_BLU.pptx
+++ b/Documents/Presentation_BLU.pptx
@@ -773,7 +773,7 @@
           <a:p>
             <a:fld id="{C4270120-CDFC-48DE-A6EA-6DEEDD0E436A}" type="datetimeFigureOut">
               <a:rPr lang="en-US" dirty="0"/>
-              <a:t>6/10/2025</a:t>
+              <a:t>6/11/2025</a:t>
             </a:fld>
             <a:endParaRPr lang="en-US" dirty="0"/>
           </a:p>
@@ -1067,7 +1067,7 @@
           <a:p>
             <a:fld id="{2A1F5BA7-0A17-4D30-9B66-E29324151C73}" type="datetimeFigureOut">
               <a:rPr lang="en-US" dirty="0"/>
-              <a:t>6/10/2025</a:t>
+              <a:t>6/11/2025</a:t>
             </a:fld>
             <a:endParaRPr lang="en-US" dirty="0"/>
           </a:p>
@@ -1323,7 +1323,7 @@
           <a:p>
             <a:fld id="{76BEBB1B-D40A-4DB9-B3DE-BAAE675B83CD}" type="datetimeFigureOut">
               <a:rPr lang="en-US" dirty="0"/>
-              <a:t>6/10/2025</a:t>
+              <a:t>6/11/2025</a:t>
             </a:fld>
             <a:endParaRPr lang="en-US" dirty="0"/>
           </a:p>
@@ -1579,7 +1579,7 @@
           <a:p>
             <a:fld id="{A3C9FAAF-C467-4C93-8ECD-39AF5A14D498}" type="datetimeFigureOut">
               <a:rPr lang="en-US" dirty="0"/>
-              <a:t>6/10/2025</a:t>
+              <a:t>6/11/2025</a:t>
             </a:fld>
             <a:endParaRPr lang="en-US" dirty="0"/>
           </a:p>
@@ -1904,7 +1904,7 @@
           <a:p>
             <a:fld id="{3E37E480-B2BA-4553-A144-61E7F75833ED}" type="datetimeFigureOut">
               <a:rPr lang="en-US" dirty="0"/>
-              <a:t>6/10/2025</a:t>
+              <a:t>6/11/2025</a:t>
             </a:fld>
             <a:endParaRPr lang="en-US" dirty="0"/>
           </a:p>
@@ -2258,7 +2258,7 @@
           <a:p>
             <a:fld id="{390E682A-6B53-4B08-AE4D-4C5E659103CC}" type="datetimeFigureOut">
               <a:rPr lang="en-US" dirty="0"/>
-              <a:t>6/10/2025</a:t>
+              <a:t>6/11/2025</a:t>
             </a:fld>
             <a:endParaRPr lang="en-US" dirty="0"/>
           </a:p>
@@ -2774,7 +2774,7 @@
           <a:p>
             <a:fld id="{7C69F0F6-BEBB-4894-ABB2-75C5CBE0DDB9}" type="datetimeFigureOut">
               <a:rPr lang="en-US" dirty="0"/>
-              <a:t>6/10/2025</a:t>
+              <a:t>6/11/2025</a:t>
             </a:fld>
             <a:endParaRPr lang="en-US" dirty="0"/>
           </a:p>
@@ -3090,7 +3090,7 @@
           <a:p>
             <a:fld id="{8B3E9E5F-17D9-4A30-9DA3-64E46A6DF111}" type="datetimeFigureOut">
               <a:rPr lang="en-US" dirty="0"/>
-              <a:t>6/10/2025</a:t>
+              <a:t>6/11/2025</a:t>
             </a:fld>
             <a:endParaRPr lang="en-US" dirty="0"/>
           </a:p>
@@ -3207,7 +3207,7 @@
           <a:p>
             <a:fld id="{033AC5F0-3BC3-4718-BCCA-24B5655EC864}" type="datetimeFigureOut">
               <a:rPr lang="en-US" dirty="0"/>
-              <a:t>6/10/2025</a:t>
+              <a:t>6/11/2025</a:t>
             </a:fld>
             <a:endParaRPr lang="en-US" dirty="0"/>
           </a:p>
@@ -3552,7 +3552,7 @@
           <a:p>
             <a:fld id="{9EB8BD81-465B-40F2-9A54-9DF3B12AF598}" type="datetimeFigureOut">
               <a:rPr lang="en-US" dirty="0"/>
-              <a:t>6/10/2025</a:t>
+              <a:t>6/11/2025</a:t>
             </a:fld>
             <a:endParaRPr lang="en-US" dirty="0"/>
           </a:p>
@@ -3856,7 +3856,7 @@
           <a:p>
             <a:fld id="{F04B3CEF-64EF-4C43-9530-8E9CBFD2CAD1}" type="datetimeFigureOut">
               <a:rPr lang="en-US" dirty="0"/>
-              <a:t>6/10/2025</a:t>
+              <a:t>6/11/2025</a:t>
             </a:fld>
             <a:endParaRPr lang="en-US" dirty="0"/>
           </a:p>
@@ -4099,7 +4099,7 @@
           <a:p>
             <a:fld id="{B70A3DFD-A535-46B2-84C1-61DC8B16A904}" type="datetimeFigureOut">
               <a:rPr lang="en-US" dirty="0"/>
-              <a:t>6/10/2025</a:t>
+              <a:t>6/11/2025</a:t>
             </a:fld>
             <a:endParaRPr lang="en-US" dirty="0"/>
           </a:p>
@@ -5203,13 +5203,13 @@
   <p:clrMapOvr>
     <a:masterClrMapping/>
   </p:clrMapOvr>
-  <mc:AlternateContent xmlns:mc="http://schemas.openxmlformats.org/markup-compatibility/2006">
-    <mc:Choice xmlns:p159="http://schemas.microsoft.com/office/powerpoint/2015/09/main" Requires="p159">
+  <mc:AlternateContent xmlns:mc="http://schemas.openxmlformats.org/markup-compatibility/2006" xmlns:p159="http://schemas.microsoft.com/office/powerpoint/2015/09/main">
+    <mc:Choice Requires="p159">
       <p:transition xmlns:p14="http://schemas.microsoft.com/office/powerpoint/2010/main" spd="slow" p14:dur="2000">
         <p159:morph option="byObject"/>
       </p:transition>
     </mc:Choice>
-    <mc:Fallback>
+    <mc:Fallback xmlns="">
       <p:transition spd="slow">
         <p:fade/>
       </p:transition>
@@ -6724,7 +6724,7 @@
           <p:nvPr/>
         </p:nvPicPr>
         <p:blipFill>
-          <a:blip r:embed="rId11"/>
+          <a:blip r:embed="rId35"/>
           <a:stretch>
             <a:fillRect/>
           </a:stretch>
@@ -6809,13 +6809,13 @@
   <p:clrMapOvr>
     <a:masterClrMapping/>
   </p:clrMapOvr>
-  <mc:AlternateContent xmlns:mc="http://schemas.openxmlformats.org/markup-compatibility/2006">
-    <mc:Choice xmlns:p159="http://schemas.microsoft.com/office/powerpoint/2015/09/main" Requires="p159">
+  <mc:AlternateContent xmlns:mc="http://schemas.openxmlformats.org/markup-compatibility/2006" xmlns:p159="http://schemas.microsoft.com/office/powerpoint/2015/09/main">
+    <mc:Choice Requires="p159">
       <p:transition xmlns:p14="http://schemas.microsoft.com/office/powerpoint/2010/main" spd="slow" p14:dur="2000">
         <p159:morph option="byObject"/>
       </p:transition>
     </mc:Choice>
-    <mc:Fallback>
+    <mc:Fallback xmlns="">
       <p:transition spd="slow">
         <p:fade/>
       </p:transition>
@@ -7472,13 +7472,13 @@
   <p:clrMapOvr>
     <a:masterClrMapping/>
   </p:clrMapOvr>
-  <mc:AlternateContent xmlns:mc="http://schemas.openxmlformats.org/markup-compatibility/2006">
-    <mc:Choice xmlns:p159="http://schemas.microsoft.com/office/powerpoint/2015/09/main" Requires="p159">
+  <mc:AlternateContent xmlns:mc="http://schemas.openxmlformats.org/markup-compatibility/2006" xmlns:p159="http://schemas.microsoft.com/office/powerpoint/2015/09/main">
+    <mc:Choice Requires="p159">
       <p:transition xmlns:p14="http://schemas.microsoft.com/office/powerpoint/2010/main" spd="slow" p14:dur="2000">
         <p159:morph option="byObject"/>
       </p:transition>
     </mc:Choice>
-    <mc:Fallback>
+    <mc:Fallback xmlns="">
       <p:transition spd="slow">
         <p:fade/>
       </p:transition>
@@ -8135,13 +8135,13 @@
   <p:clrMapOvr>
     <a:masterClrMapping/>
   </p:clrMapOvr>
-  <mc:AlternateContent xmlns:mc="http://schemas.openxmlformats.org/markup-compatibility/2006">
-    <mc:Choice xmlns:p159="http://schemas.microsoft.com/office/powerpoint/2015/09/main" Requires="p159">
+  <mc:AlternateContent xmlns:mc="http://schemas.openxmlformats.org/markup-compatibility/2006" xmlns:p159="http://schemas.microsoft.com/office/powerpoint/2015/09/main">
+    <mc:Choice Requires="p159">
       <p:transition xmlns:p14="http://schemas.microsoft.com/office/powerpoint/2010/main" spd="slow" p14:dur="2000">
         <p159:morph option="byObject"/>
       </p:transition>
     </mc:Choice>
-    <mc:Fallback>
+    <mc:Fallback xmlns="">
       <p:transition spd="slow">
         <p:fade/>
       </p:transition>
@@ -8798,13 +8798,13 @@
   <p:clrMapOvr>
     <a:masterClrMapping/>
   </p:clrMapOvr>
-  <mc:AlternateContent xmlns:mc="http://schemas.openxmlformats.org/markup-compatibility/2006">
-    <mc:Choice xmlns:p159="http://schemas.microsoft.com/office/powerpoint/2015/09/main" Requires="p159">
+  <mc:AlternateContent xmlns:mc="http://schemas.openxmlformats.org/markup-compatibility/2006" xmlns:p159="http://schemas.microsoft.com/office/powerpoint/2015/09/main">
+    <mc:Choice Requires="p159">
       <p:transition xmlns:p14="http://schemas.microsoft.com/office/powerpoint/2010/main" spd="slow" p14:dur="2000">
         <p159:morph option="byObject"/>
       </p:transition>
     </mc:Choice>
-    <mc:Fallback>
+    <mc:Fallback xmlns="">
       <p:transition spd="slow">
         <p:fade/>
       </p:transition>
@@ -9461,13 +9461,13 @@
   <p:clrMapOvr>
     <a:masterClrMapping/>
   </p:clrMapOvr>
-  <mc:AlternateContent xmlns:mc="http://schemas.openxmlformats.org/markup-compatibility/2006">
-    <mc:Choice xmlns:p159="http://schemas.microsoft.com/office/powerpoint/2015/09/main" Requires="p159">
+  <mc:AlternateContent xmlns:mc="http://schemas.openxmlformats.org/markup-compatibility/2006" xmlns:p159="http://schemas.microsoft.com/office/powerpoint/2015/09/main">
+    <mc:Choice Requires="p159">
       <p:transition xmlns:p14="http://schemas.microsoft.com/office/powerpoint/2010/main" spd="slow" p14:dur="2000">
         <p159:morph option="byObject"/>
       </p:transition>
     </mc:Choice>
-    <mc:Fallback>
+    <mc:Fallback xmlns="">
       <p:transition spd="slow">
         <p:fade/>
       </p:transition>
@@ -10314,13 +10314,13 @@
   <p:clrMapOvr>
     <a:masterClrMapping/>
   </p:clrMapOvr>
-  <mc:AlternateContent xmlns:mc="http://schemas.openxmlformats.org/markup-compatibility/2006">
-    <mc:Choice xmlns:p159="http://schemas.microsoft.com/office/powerpoint/2015/09/main" Requires="p159">
+  <mc:AlternateContent xmlns:mc="http://schemas.openxmlformats.org/markup-compatibility/2006" xmlns:p159="http://schemas.microsoft.com/office/powerpoint/2015/09/main">
+    <mc:Choice Requires="p159">
       <p:transition xmlns:p14="http://schemas.microsoft.com/office/powerpoint/2010/main" spd="slow" p14:dur="2000">
         <p159:morph option="byObject"/>
       </p:transition>
     </mc:Choice>
-    <mc:Fallback>
+    <mc:Fallback xmlns="">
       <p:transition spd="slow">
         <p:fade/>
       </p:transition>
@@ -10705,13 +10705,13 @@
   <p:clrMapOvr>
     <a:masterClrMapping/>
   </p:clrMapOvr>
-  <mc:AlternateContent xmlns:mc="http://schemas.openxmlformats.org/markup-compatibility/2006">
-    <mc:Choice xmlns:p159="http://schemas.microsoft.com/office/powerpoint/2015/09/main" Requires="p159">
+  <mc:AlternateContent xmlns:mc="http://schemas.openxmlformats.org/markup-compatibility/2006" xmlns:p159="http://schemas.microsoft.com/office/powerpoint/2015/09/main">
+    <mc:Choice Requires="p159">
       <p:transition xmlns:p14="http://schemas.microsoft.com/office/powerpoint/2010/main" spd="slow" p14:dur="2000">
         <p159:morph option="byObject"/>
       </p:transition>
     </mc:Choice>
-    <mc:Fallback>
+    <mc:Fallback xmlns="">
       <p:transition spd="slow">
         <p:fade/>
       </p:transition>

</xml_diff>